<commit_message>
Worked on Final Exam
</commit_message>
<xml_diff>
--- a/Presentations/Social Engineering.pptx
+++ b/Presentations/Social Engineering.pptx
@@ -2724,7 +2724,7 @@
             <a:fld id="{5586B75A-687E-405C-8A0B-8D00578BA2C3}" type="datetimeFigureOut">
               <a:rPr lang="en-US" dirty="0"/>
               <a:pPr/>
-              <a:t>4/3/22</a:t>
+              <a:t>4/4/22</a:t>
             </a:fld>
             <a:endParaRPr lang="en-US" dirty="0"/>
           </a:p>
@@ -2891,7 +2891,7 @@
             <a:fld id="{5586B75A-687E-405C-8A0B-8D00578BA2C3}" type="datetimeFigureOut">
               <a:rPr lang="en-US" dirty="0"/>
               <a:pPr/>
-              <a:t>4/3/22</a:t>
+              <a:t>4/4/22</a:t>
             </a:fld>
             <a:endParaRPr lang="en-US" dirty="0"/>
           </a:p>
@@ -3068,7 +3068,7 @@
             <a:fld id="{5586B75A-687E-405C-8A0B-8D00578BA2C3}" type="datetimeFigureOut">
               <a:rPr lang="en-US" dirty="0"/>
               <a:pPr/>
-              <a:t>4/3/22</a:t>
+              <a:t>4/4/22</a:t>
             </a:fld>
             <a:endParaRPr lang="en-US" dirty="0"/>
           </a:p>
@@ -3235,7 +3235,7 @@
             <a:fld id="{5586B75A-687E-405C-8A0B-8D00578BA2C3}" type="datetimeFigureOut">
               <a:rPr lang="en-US" dirty="0"/>
               <a:pPr/>
-              <a:t>4/3/22</a:t>
+              <a:t>4/4/22</a:t>
             </a:fld>
             <a:endParaRPr lang="en-US" dirty="0"/>
           </a:p>
@@ -3490,7 +3490,7 @@
             <a:fld id="{5586B75A-687E-405C-8A0B-8D00578BA2C3}" type="datetimeFigureOut">
               <a:rPr lang="en-US" dirty="0"/>
               <a:pPr/>
-              <a:t>4/3/22</a:t>
+              <a:t>4/4/22</a:t>
             </a:fld>
             <a:endParaRPr lang="en-US" dirty="0"/>
           </a:p>
@@ -3775,7 +3775,7 @@
             <a:fld id="{5586B75A-687E-405C-8A0B-8D00578BA2C3}" type="datetimeFigureOut">
               <a:rPr lang="en-US" dirty="0"/>
               <a:pPr/>
-              <a:t>4/3/22</a:t>
+              <a:t>4/4/22</a:t>
             </a:fld>
             <a:endParaRPr lang="en-US" dirty="0"/>
           </a:p>
@@ -4214,7 +4214,7 @@
             <a:fld id="{5586B75A-687E-405C-8A0B-8D00578BA2C3}" type="datetimeFigureOut">
               <a:rPr lang="en-US" dirty="0"/>
               <a:pPr/>
-              <a:t>4/3/22</a:t>
+              <a:t>4/4/22</a:t>
             </a:fld>
             <a:endParaRPr lang="en-US" dirty="0"/>
           </a:p>
@@ -4329,7 +4329,7 @@
             <a:fld id="{5586B75A-687E-405C-8A0B-8D00578BA2C3}" type="datetimeFigureOut">
               <a:rPr lang="en-US" dirty="0"/>
               <a:pPr/>
-              <a:t>4/3/22</a:t>
+              <a:t>4/4/22</a:t>
             </a:fld>
             <a:endParaRPr lang="en-US" dirty="0"/>
           </a:p>
@@ -4421,7 +4421,7 @@
             <a:fld id="{5586B75A-687E-405C-8A0B-8D00578BA2C3}" type="datetimeFigureOut">
               <a:rPr lang="en-US" dirty="0"/>
               <a:pPr/>
-              <a:t>4/3/22</a:t>
+              <a:t>4/4/22</a:t>
             </a:fld>
             <a:endParaRPr lang="en-US" dirty="0"/>
           </a:p>
@@ -4706,7 +4706,7 @@
             <a:fld id="{5586B75A-687E-405C-8A0B-8D00578BA2C3}" type="datetimeFigureOut">
               <a:rPr lang="en-US" dirty="0"/>
               <a:pPr/>
-              <a:t>4/3/22</a:t>
+              <a:t>4/4/22</a:t>
             </a:fld>
             <a:endParaRPr lang="en-US" dirty="0"/>
           </a:p>
@@ -4976,7 +4976,7 @@
             <a:fld id="{5586B75A-687E-405C-8A0B-8D00578BA2C3}" type="datetimeFigureOut">
               <a:rPr lang="en-US" dirty="0"/>
               <a:pPr/>
-              <a:t>4/3/22</a:t>
+              <a:t>4/4/22</a:t>
             </a:fld>
             <a:endParaRPr lang="en-US" dirty="0"/>
           </a:p>
@@ -5270,7 +5270,7 @@
             <a:fld id="{5586B75A-687E-405C-8A0B-8D00578BA2C3}" type="datetimeFigureOut">
               <a:rPr lang="en-US" dirty="0"/>
               <a:pPr/>
-              <a:t>4/3/22</a:t>
+              <a:t>4/4/22</a:t>
             </a:fld>
             <a:endParaRPr lang="en-US" dirty="0"/>
           </a:p>

</xml_diff>